<commit_message>
Fixed a typo on powerpoint, pushing module 4
</commit_message>
<xml_diff>
--- a/Presentations/Presentations Power Point/04_Arrays & hashes.pptx
+++ b/Presentations/Presentations Power Point/04_Arrays & hashes.pptx
@@ -324,6 +324,11 @@
       </a:defRPr>
     </a:lvl9pPr>
   </p:defaultTextStyle>
+  <p:extLst>
+    <p:ext uri="{EFAFB233-063F-42B5-8137-9DF3F51BA10A}">
+      <p15:sldGuideLst xmlns:p15="http://schemas.microsoft.com/office/powerpoint/2012/main"/>
+    </p:ext>
+  </p:extLst>
 </p:presentation>
 </file>
 
@@ -2104,7 +2109,7 @@
           </a:ln>
           <a:extLst>
             <a:ext uri="{C572A759-6A51-4108-AA02-DFA0A04FC94B}">
-              <ma14:wrappingTextBoxFlag xmlns:ma14="http://schemas.microsoft.com/office/mac/drawingml/2011/main" xmlns:a14="http://schemas.microsoft.com/office/drawing/2010/main" xmlns:m="http://schemas.openxmlformats.org/officeDocument/2006/math" xmlns="" val="1"/>
+              <ma14:wrappingTextBoxFlag xmlns="" xmlns:m="http://schemas.openxmlformats.org/officeDocument/2006/math" xmlns:a14="http://schemas.microsoft.com/office/drawing/2010/main" xmlns:ma14="http://schemas.microsoft.com/office/mac/drawingml/2011/main" val="1"/>
             </a:ext>
           </a:extLst>
         </p:spPr>
@@ -2143,7 +2148,7 @@
           </a:ln>
           <a:extLst>
             <a:ext uri="{C572A759-6A51-4108-AA02-DFA0A04FC94B}">
-              <ma14:wrappingTextBoxFlag xmlns:ma14="http://schemas.microsoft.com/office/mac/drawingml/2011/main" xmlns:a14="http://schemas.microsoft.com/office/drawing/2010/main" xmlns:m="http://schemas.openxmlformats.org/officeDocument/2006/math" xmlns="" val="1"/>
+              <ma14:wrappingTextBoxFlag xmlns="" xmlns:m="http://schemas.openxmlformats.org/officeDocument/2006/math" xmlns:a14="http://schemas.microsoft.com/office/drawing/2010/main" xmlns:ma14="http://schemas.microsoft.com/office/mac/drawingml/2011/main" val="1"/>
             </a:ext>
           </a:extLst>
         </p:spPr>
@@ -2997,7 +3002,7 @@
           </a:ln>
           <a:extLst>
             <a:ext uri="{C572A759-6A51-4108-AA02-DFA0A04FC94B}">
-              <ma14:wrappingTextBoxFlag xmlns:ma14="http://schemas.microsoft.com/office/mac/drawingml/2011/main" xmlns:a14="http://schemas.microsoft.com/office/drawing/2010/main" xmlns:m="http://schemas.openxmlformats.org/officeDocument/2006/math" xmlns="" val="1"/>
+              <ma14:wrappingTextBoxFlag xmlns="" xmlns:m="http://schemas.openxmlformats.org/officeDocument/2006/math" xmlns:a14="http://schemas.microsoft.com/office/drawing/2010/main" xmlns:ma14="http://schemas.microsoft.com/office/mac/drawingml/2011/main" val="1"/>
             </a:ext>
           </a:extLst>
         </p:spPr>
@@ -3012,9 +3017,9 @@
                 <a:solidFill>
                   <a:srgbClr val="000000"/>
                 </a:solidFill>
-                <a:latin typeface="Circular Std"/>
-                <a:ea typeface="Circular Std"/>
-                <a:cs typeface="Circular Std"/>
+                <a:latin typeface="CircularStd-Bold"/>
+                <a:ea typeface="CircularStd-Bold"/>
+                <a:cs typeface="CircularStd-Bold"/>
                 <a:sym typeface="Circular Std"/>
               </a:defRPr>
             </a:pPr>
@@ -3028,9 +3033,9 @@
                 <a:solidFill>
                   <a:srgbClr val="000000"/>
                 </a:solidFill>
-                <a:latin typeface="Circular Std"/>
-                <a:ea typeface="Circular Std"/>
-                <a:cs typeface="Circular Std"/>
+                <a:latin typeface="CircularStd-Bold"/>
+                <a:ea typeface="CircularStd-Bold"/>
+                <a:cs typeface="CircularStd-Bold"/>
                 <a:sym typeface="Circular Std"/>
               </a:defRPr>
             </a:pPr>
@@ -3044,9 +3049,9 @@
                 <a:solidFill>
                   <a:srgbClr val="000000"/>
                 </a:solidFill>
-                <a:latin typeface="Circular Std"/>
-                <a:ea typeface="Circular Std"/>
-                <a:cs typeface="Circular Std"/>
+                <a:latin typeface="CircularStd-Bold"/>
+                <a:ea typeface="CircularStd-Bold"/>
+                <a:cs typeface="CircularStd-Bold"/>
                 <a:sym typeface="Circular Std"/>
               </a:defRPr>
             </a:pPr>
@@ -3060,9 +3065,9 @@
                 <a:solidFill>
                   <a:srgbClr val="FFFFFF"/>
                 </a:solidFill>
-                <a:latin typeface="Circular Std"/>
-                <a:ea typeface="Circular Std"/>
-                <a:cs typeface="Circular Std"/>
+                <a:latin typeface="CircularStd-Bold"/>
+                <a:ea typeface="CircularStd-Bold"/>
+                <a:cs typeface="CircularStd-Bold"/>
                 <a:sym typeface="Circular Std"/>
               </a:defRPr>
             </a:pPr>
@@ -3074,9 +3079,9 @@
                 <a:solidFill>
                   <a:srgbClr val="000000"/>
                 </a:solidFill>
-                <a:latin typeface="Circular Std"/>
-                <a:ea typeface="Circular Std"/>
-                <a:cs typeface="Circular Std"/>
+                <a:latin typeface="CircularStd-Bold"/>
+                <a:ea typeface="CircularStd-Bold"/>
+                <a:cs typeface="CircularStd-Bold"/>
                 <a:sym typeface="Circular Std"/>
               </a:defRPr>
             </a:pPr>
@@ -3185,7 +3190,7 @@
           </a:ln>
           <a:extLst>
             <a:ext uri="{C572A759-6A51-4108-AA02-DFA0A04FC94B}">
-              <ma14:wrappingTextBoxFlag xmlns:ma14="http://schemas.microsoft.com/office/mac/drawingml/2011/main" xmlns:a14="http://schemas.microsoft.com/office/drawing/2010/main" xmlns:m="http://schemas.openxmlformats.org/officeDocument/2006/math" xmlns="" val="1"/>
+              <ma14:wrappingTextBoxFlag xmlns="" xmlns:m="http://schemas.openxmlformats.org/officeDocument/2006/math" xmlns:a14="http://schemas.microsoft.com/office/drawing/2010/main" xmlns:ma14="http://schemas.microsoft.com/office/mac/drawingml/2011/main" val="1"/>
             </a:ext>
           </a:extLst>
         </p:spPr>
@@ -3252,7 +3257,7 @@
           </a:ln>
           <a:extLst>
             <a:ext uri="{C572A759-6A51-4108-AA02-DFA0A04FC94B}">
-              <ma14:wrappingTextBoxFlag xmlns:ma14="http://schemas.microsoft.com/office/mac/drawingml/2011/main" xmlns:a14="http://schemas.microsoft.com/office/drawing/2010/main" xmlns:m="http://schemas.openxmlformats.org/officeDocument/2006/math" xmlns="" val="1"/>
+              <ma14:wrappingTextBoxFlag xmlns="" xmlns:m="http://schemas.openxmlformats.org/officeDocument/2006/math" xmlns:a14="http://schemas.microsoft.com/office/drawing/2010/main" xmlns:ma14="http://schemas.microsoft.com/office/mac/drawingml/2011/main" val="1"/>
             </a:ext>
           </a:extLst>
         </p:spPr>
@@ -3684,7 +3689,7 @@
           </a:ln>
           <a:extLst>
             <a:ext uri="{C572A759-6A51-4108-AA02-DFA0A04FC94B}">
-              <ma14:wrappingTextBoxFlag xmlns:ma14="http://schemas.microsoft.com/office/mac/drawingml/2011/main" xmlns:a14="http://schemas.microsoft.com/office/drawing/2010/main" xmlns:m="http://schemas.openxmlformats.org/officeDocument/2006/math" xmlns="" val="1"/>
+              <ma14:wrappingTextBoxFlag xmlns="" xmlns:m="http://schemas.openxmlformats.org/officeDocument/2006/math" xmlns:a14="http://schemas.microsoft.com/office/drawing/2010/main" xmlns:ma14="http://schemas.microsoft.com/office/mac/drawingml/2011/main" val="1"/>
             </a:ext>
           </a:extLst>
         </p:spPr>
@@ -3743,7 +3748,7 @@
           </a:ln>
           <a:extLst>
             <a:ext uri="{C572A759-6A51-4108-AA02-DFA0A04FC94B}">
-              <ma14:wrappingTextBoxFlag xmlns:ma14="http://schemas.microsoft.com/office/mac/drawingml/2011/main" xmlns:a14="http://schemas.microsoft.com/office/drawing/2010/main" xmlns:m="http://schemas.openxmlformats.org/officeDocument/2006/math" xmlns="" val="1"/>
+              <ma14:wrappingTextBoxFlag xmlns="" xmlns:m="http://schemas.openxmlformats.org/officeDocument/2006/math" xmlns:a14="http://schemas.microsoft.com/office/drawing/2010/main" xmlns:ma14="http://schemas.microsoft.com/office/mac/drawingml/2011/main" val="1"/>
             </a:ext>
           </a:extLst>
         </p:spPr>
@@ -3851,7 +3856,7 @@
           </a:ln>
           <a:extLst>
             <a:ext uri="{C572A759-6A51-4108-AA02-DFA0A04FC94B}">
-              <ma14:wrappingTextBoxFlag xmlns:ma14="http://schemas.microsoft.com/office/mac/drawingml/2011/main" xmlns:a14="http://schemas.microsoft.com/office/drawing/2010/main" xmlns:m="http://schemas.openxmlformats.org/officeDocument/2006/math" xmlns="" val="1"/>
+              <ma14:wrappingTextBoxFlag xmlns="" xmlns:m="http://schemas.openxmlformats.org/officeDocument/2006/math" xmlns:a14="http://schemas.microsoft.com/office/drawing/2010/main" xmlns:ma14="http://schemas.microsoft.com/office/mac/drawingml/2011/main" val="1"/>
             </a:ext>
           </a:extLst>
         </p:spPr>
@@ -3910,7 +3915,7 @@
           </a:ln>
           <a:extLst>
             <a:ext uri="{C572A759-6A51-4108-AA02-DFA0A04FC94B}">
-              <ma14:wrappingTextBoxFlag xmlns:ma14="http://schemas.microsoft.com/office/mac/drawingml/2011/main" xmlns:a14="http://schemas.microsoft.com/office/drawing/2010/main" xmlns:m="http://schemas.openxmlformats.org/officeDocument/2006/math" xmlns="" val="1"/>
+              <ma14:wrappingTextBoxFlag xmlns="" xmlns:m="http://schemas.openxmlformats.org/officeDocument/2006/math" xmlns:a14="http://schemas.microsoft.com/office/drawing/2010/main" xmlns:ma14="http://schemas.microsoft.com/office/mac/drawingml/2011/main" val="1"/>
             </a:ext>
           </a:extLst>
         </p:spPr>
@@ -4412,7 +4417,7 @@
           </a:ln>
           <a:extLst>
             <a:ext uri="{C572A759-6A51-4108-AA02-DFA0A04FC94B}">
-              <ma14:wrappingTextBoxFlag xmlns:ma14="http://schemas.microsoft.com/office/mac/drawingml/2011/main" xmlns:a14="http://schemas.microsoft.com/office/drawing/2010/main" xmlns:m="http://schemas.openxmlformats.org/officeDocument/2006/math" xmlns="" val="1"/>
+              <ma14:wrappingTextBoxFlag xmlns="" xmlns:m="http://schemas.openxmlformats.org/officeDocument/2006/math" xmlns:a14="http://schemas.microsoft.com/office/drawing/2010/main" xmlns:ma14="http://schemas.microsoft.com/office/mac/drawingml/2011/main" val="1"/>
             </a:ext>
           </a:extLst>
         </p:spPr>
@@ -4471,7 +4476,7 @@
           </a:ln>
           <a:extLst>
             <a:ext uri="{C572A759-6A51-4108-AA02-DFA0A04FC94B}">
-              <ma14:wrappingTextBoxFlag xmlns:ma14="http://schemas.microsoft.com/office/mac/drawingml/2011/main" xmlns:a14="http://schemas.microsoft.com/office/drawing/2010/main" xmlns:m="http://schemas.openxmlformats.org/officeDocument/2006/math" xmlns="" val="1"/>
+              <ma14:wrappingTextBoxFlag xmlns="" xmlns:m="http://schemas.openxmlformats.org/officeDocument/2006/math" xmlns:a14="http://schemas.microsoft.com/office/drawing/2010/main" xmlns:ma14="http://schemas.microsoft.com/office/mac/drawingml/2011/main" val="1"/>
             </a:ext>
           </a:extLst>
         </p:spPr>
@@ -4891,7 +4896,7 @@
           </a:ln>
           <a:extLst>
             <a:ext uri="{C572A759-6A51-4108-AA02-DFA0A04FC94B}">
-              <ma14:wrappingTextBoxFlag xmlns:ma14="http://schemas.microsoft.com/office/mac/drawingml/2011/main" xmlns:a14="http://schemas.microsoft.com/office/drawing/2010/main" xmlns:m="http://schemas.openxmlformats.org/officeDocument/2006/math" xmlns="" val="1"/>
+              <ma14:wrappingTextBoxFlag xmlns="" xmlns:m="http://schemas.openxmlformats.org/officeDocument/2006/math" xmlns:a14="http://schemas.microsoft.com/office/drawing/2010/main" xmlns:ma14="http://schemas.microsoft.com/office/mac/drawingml/2011/main" val="1"/>
             </a:ext>
           </a:extLst>
         </p:spPr>
@@ -4950,7 +4955,7 @@
           </a:ln>
           <a:extLst>
             <a:ext uri="{C572A759-6A51-4108-AA02-DFA0A04FC94B}">
-              <ma14:wrappingTextBoxFlag xmlns:ma14="http://schemas.microsoft.com/office/mac/drawingml/2011/main" xmlns:a14="http://schemas.microsoft.com/office/drawing/2010/main" xmlns:m="http://schemas.openxmlformats.org/officeDocument/2006/math" xmlns="" val="1"/>
+              <ma14:wrappingTextBoxFlag xmlns="" xmlns:m="http://schemas.openxmlformats.org/officeDocument/2006/math" xmlns:a14="http://schemas.microsoft.com/office/drawing/2010/main" xmlns:ma14="http://schemas.microsoft.com/office/mac/drawingml/2011/main" val="1"/>
             </a:ext>
           </a:extLst>
         </p:spPr>
@@ -5494,7 +5499,7 @@
             <a:effectLst/>
             <a:extLst>
               <a:ext uri="{C572A759-6A51-4108-AA02-DFA0A04FC94B}">
-                <ma14:wrappingTextBoxFlag xmlns:ma14="http://schemas.microsoft.com/office/mac/drawingml/2011/main" xmlns:a14="http://schemas.microsoft.com/office/drawing/2010/main" xmlns:m="http://schemas.openxmlformats.org/officeDocument/2006/math" xmlns="" val="1"/>
+                <ma14:wrappingTextBoxFlag xmlns="" xmlns:m="http://schemas.openxmlformats.org/officeDocument/2006/math" xmlns:a14="http://schemas.microsoft.com/office/drawing/2010/main" xmlns:ma14="http://schemas.microsoft.com/office/mac/drawingml/2011/main" val="1"/>
               </a:ext>
             </a:extLst>
           </p:spPr>
@@ -5548,7 +5553,7 @@
             <a:effectLst/>
             <a:extLst>
               <a:ext uri="{C572A759-6A51-4108-AA02-DFA0A04FC94B}">
-                <ma14:wrappingTextBoxFlag xmlns:ma14="http://schemas.microsoft.com/office/mac/drawingml/2011/main" xmlns:a14="http://schemas.microsoft.com/office/drawing/2010/main" xmlns:m="http://schemas.openxmlformats.org/officeDocument/2006/math" xmlns="" val="1"/>
+                <ma14:wrappingTextBoxFlag xmlns="" xmlns:m="http://schemas.openxmlformats.org/officeDocument/2006/math" xmlns:a14="http://schemas.microsoft.com/office/drawing/2010/main" xmlns:ma14="http://schemas.microsoft.com/office/mac/drawingml/2011/main" val="1"/>
               </a:ext>
             </a:extLst>
           </p:spPr>
@@ -5649,7 +5654,7 @@
           </a:ln>
           <a:extLst>
             <a:ext uri="{C572A759-6A51-4108-AA02-DFA0A04FC94B}">
-              <ma14:wrappingTextBoxFlag xmlns:ma14="http://schemas.microsoft.com/office/mac/drawingml/2011/main" xmlns:a14="http://schemas.microsoft.com/office/drawing/2010/main" xmlns:m="http://schemas.openxmlformats.org/officeDocument/2006/math" xmlns="" val="1"/>
+              <ma14:wrappingTextBoxFlag xmlns="" xmlns:m="http://schemas.openxmlformats.org/officeDocument/2006/math" xmlns:a14="http://schemas.microsoft.com/office/drawing/2010/main" xmlns:ma14="http://schemas.microsoft.com/office/mac/drawingml/2011/main" val="1"/>
             </a:ext>
           </a:extLst>
         </p:spPr>
@@ -5708,7 +5713,7 @@
           </a:ln>
           <a:extLst>
             <a:ext uri="{C572A759-6A51-4108-AA02-DFA0A04FC94B}">
-              <ma14:wrappingTextBoxFlag xmlns:ma14="http://schemas.microsoft.com/office/mac/drawingml/2011/main" xmlns:a14="http://schemas.microsoft.com/office/drawing/2010/main" xmlns:m="http://schemas.openxmlformats.org/officeDocument/2006/math" xmlns="" val="1"/>
+              <ma14:wrappingTextBoxFlag xmlns="" xmlns:m="http://schemas.openxmlformats.org/officeDocument/2006/math" xmlns:a14="http://schemas.microsoft.com/office/drawing/2010/main" xmlns:ma14="http://schemas.microsoft.com/office/mac/drawingml/2011/main" val="1"/>
             </a:ext>
           </a:extLst>
         </p:spPr>
@@ -6021,7 +6026,7 @@
           </a:ln>
           <a:extLst>
             <a:ext uri="{C572A759-6A51-4108-AA02-DFA0A04FC94B}">
-              <ma14:wrappingTextBoxFlag xmlns:ma14="http://schemas.microsoft.com/office/mac/drawingml/2011/main" xmlns:a14="http://schemas.microsoft.com/office/drawing/2010/main" xmlns:m="http://schemas.openxmlformats.org/officeDocument/2006/math" xmlns="" val="1"/>
+              <ma14:wrappingTextBoxFlag xmlns="" xmlns:m="http://schemas.openxmlformats.org/officeDocument/2006/math" xmlns:a14="http://schemas.microsoft.com/office/drawing/2010/main" xmlns:ma14="http://schemas.microsoft.com/office/mac/drawingml/2011/main" val="1"/>
             </a:ext>
           </a:extLst>
         </p:spPr>
@@ -6088,7 +6093,7 @@
           </a:ln>
           <a:extLst>
             <a:ext uri="{C572A759-6A51-4108-AA02-DFA0A04FC94B}">
-              <ma14:wrappingTextBoxFlag xmlns:ma14="http://schemas.microsoft.com/office/mac/drawingml/2011/main" xmlns:a14="http://schemas.microsoft.com/office/drawing/2010/main" xmlns:m="http://schemas.openxmlformats.org/officeDocument/2006/math" xmlns="" val="1"/>
+              <ma14:wrappingTextBoxFlag xmlns="" xmlns:m="http://schemas.openxmlformats.org/officeDocument/2006/math" xmlns:a14="http://schemas.microsoft.com/office/drawing/2010/main" xmlns:ma14="http://schemas.microsoft.com/office/mac/drawingml/2011/main" val="1"/>
             </a:ext>
           </a:extLst>
         </p:spPr>
@@ -6383,7 +6388,7 @@
           </a:ln>
           <a:extLst>
             <a:ext uri="{C572A759-6A51-4108-AA02-DFA0A04FC94B}">
-              <ma14:wrappingTextBoxFlag xmlns:ma14="http://schemas.microsoft.com/office/mac/drawingml/2011/main" xmlns:a14="http://schemas.microsoft.com/office/drawing/2010/main" xmlns:m="http://schemas.openxmlformats.org/officeDocument/2006/math" xmlns="" val="1"/>
+              <ma14:wrappingTextBoxFlag xmlns="" xmlns:m="http://schemas.openxmlformats.org/officeDocument/2006/math" xmlns:a14="http://schemas.microsoft.com/office/drawing/2010/main" xmlns:ma14="http://schemas.microsoft.com/office/mac/drawingml/2011/main" val="1"/>
             </a:ext>
           </a:extLst>
         </p:spPr>
@@ -6450,7 +6455,7 @@
           </a:ln>
           <a:extLst>
             <a:ext uri="{C572A759-6A51-4108-AA02-DFA0A04FC94B}">
-              <ma14:wrappingTextBoxFlag xmlns:ma14="http://schemas.microsoft.com/office/mac/drawingml/2011/main" xmlns:a14="http://schemas.microsoft.com/office/drawing/2010/main" xmlns:m="http://schemas.openxmlformats.org/officeDocument/2006/math" xmlns="" val="1"/>
+              <ma14:wrappingTextBoxFlag xmlns="" xmlns:m="http://schemas.openxmlformats.org/officeDocument/2006/math" xmlns:a14="http://schemas.microsoft.com/office/drawing/2010/main" xmlns:ma14="http://schemas.microsoft.com/office/mac/drawingml/2011/main" val="1"/>
             </a:ext>
           </a:extLst>
         </p:spPr>
@@ -6850,7 +6855,7 @@
           </a:ln>
           <a:extLst>
             <a:ext uri="{C572A759-6A51-4108-AA02-DFA0A04FC94B}">
-              <ma14:wrappingTextBoxFlag xmlns:ma14="http://schemas.microsoft.com/office/mac/drawingml/2011/main" xmlns:a14="http://schemas.microsoft.com/office/drawing/2010/main" xmlns:m="http://schemas.openxmlformats.org/officeDocument/2006/math" xmlns="" val="1"/>
+              <ma14:wrappingTextBoxFlag xmlns="" xmlns:m="http://schemas.openxmlformats.org/officeDocument/2006/math" xmlns:a14="http://schemas.microsoft.com/office/drawing/2010/main" xmlns:ma14="http://schemas.microsoft.com/office/mac/drawingml/2011/main" val="1"/>
             </a:ext>
           </a:extLst>
         </p:spPr>
@@ -6917,7 +6922,7 @@
           </a:ln>
           <a:extLst>
             <a:ext uri="{C572A759-6A51-4108-AA02-DFA0A04FC94B}">
-              <ma14:wrappingTextBoxFlag xmlns:ma14="http://schemas.microsoft.com/office/mac/drawingml/2011/main" xmlns:a14="http://schemas.microsoft.com/office/drawing/2010/main" xmlns:m="http://schemas.openxmlformats.org/officeDocument/2006/math" xmlns="" val="1"/>
+              <ma14:wrappingTextBoxFlag xmlns="" xmlns:m="http://schemas.openxmlformats.org/officeDocument/2006/math" xmlns:a14="http://schemas.microsoft.com/office/drawing/2010/main" xmlns:ma14="http://schemas.microsoft.com/office/mac/drawingml/2011/main" val="1"/>
             </a:ext>
           </a:extLst>
         </p:spPr>
@@ -7321,7 +7326,7 @@
           </a:ln>
           <a:extLst>
             <a:ext uri="{C572A759-6A51-4108-AA02-DFA0A04FC94B}">
-              <ma14:wrappingTextBoxFlag xmlns:ma14="http://schemas.microsoft.com/office/mac/drawingml/2011/main" xmlns:a14="http://schemas.microsoft.com/office/drawing/2010/main" xmlns:m="http://schemas.openxmlformats.org/officeDocument/2006/math" xmlns="" val="1"/>
+              <ma14:wrappingTextBoxFlag xmlns="" xmlns:m="http://schemas.openxmlformats.org/officeDocument/2006/math" xmlns:a14="http://schemas.microsoft.com/office/drawing/2010/main" xmlns:ma14="http://schemas.microsoft.com/office/mac/drawingml/2011/main" val="1"/>
             </a:ext>
           </a:extLst>
         </p:spPr>
@@ -7388,7 +7393,7 @@
           </a:ln>
           <a:extLst>
             <a:ext uri="{C572A759-6A51-4108-AA02-DFA0A04FC94B}">
-              <ma14:wrappingTextBoxFlag xmlns:ma14="http://schemas.microsoft.com/office/mac/drawingml/2011/main" xmlns:a14="http://schemas.microsoft.com/office/drawing/2010/main" xmlns:m="http://schemas.openxmlformats.org/officeDocument/2006/math" xmlns="" val="1"/>
+              <ma14:wrappingTextBoxFlag xmlns="" xmlns:m="http://schemas.openxmlformats.org/officeDocument/2006/math" xmlns:a14="http://schemas.microsoft.com/office/drawing/2010/main" xmlns:ma14="http://schemas.microsoft.com/office/mac/drawingml/2011/main" val="1"/>
             </a:ext>
           </a:extLst>
         </p:spPr>
@@ -7841,7 +7846,7 @@
           </a:ln>
           <a:extLst>
             <a:ext uri="{C572A759-6A51-4108-AA02-DFA0A04FC94B}">
-              <ma14:wrappingTextBoxFlag xmlns:ma14="http://schemas.microsoft.com/office/mac/drawingml/2011/main" xmlns:a14="http://schemas.microsoft.com/office/drawing/2010/main" xmlns:m="http://schemas.openxmlformats.org/officeDocument/2006/math" xmlns="" val="1"/>
+              <ma14:wrappingTextBoxFlag xmlns="" xmlns:m="http://schemas.openxmlformats.org/officeDocument/2006/math" xmlns:a14="http://schemas.microsoft.com/office/drawing/2010/main" xmlns:ma14="http://schemas.microsoft.com/office/mac/drawingml/2011/main" val="1"/>
             </a:ext>
           </a:extLst>
         </p:spPr>
@@ -7889,8 +7894,8 @@
         </p:nvSpPr>
         <p:spPr>
           <a:xfrm>
-            <a:off x="453844" y="2005962"/>
-            <a:ext cx="12332894" cy="7671036"/>
+            <a:off x="453844" y="1898093"/>
+            <a:ext cx="12332894" cy="7886774"/>
           </a:xfrm>
           <a:prstGeom prst="rect">
             <a:avLst/>
@@ -7900,7 +7905,7 @@
           </a:ln>
           <a:extLst>
             <a:ext uri="{C572A759-6A51-4108-AA02-DFA0A04FC94B}">
-              <ma14:wrappingTextBoxFlag xmlns:ma14="http://schemas.microsoft.com/office/mac/drawingml/2011/main" xmlns:a14="http://schemas.microsoft.com/office/drawing/2010/main" xmlns:m="http://schemas.openxmlformats.org/officeDocument/2006/math" xmlns="" val="1"/>
+              <ma14:wrappingTextBoxFlag xmlns="" xmlns:m="http://schemas.openxmlformats.org/officeDocument/2006/math" xmlns:a14="http://schemas.microsoft.com/office/drawing/2010/main" xmlns:ma14="http://schemas.microsoft.com/office/mac/drawingml/2011/main" val="1"/>
             </a:ext>
           </a:extLst>
         </p:spPr>
@@ -7950,11 +7955,15 @@
             </a:r>
             <a:r>
               <a:rPr dirty="0" err="1"/>
-              <a:t>moe</a:t>
+              <a:t>mo</a:t>
+            </a:r>
+            <a:r>
+              <a:rPr lang="en-CA" dirty="0"/>
+              <a:t>r</a:t>
             </a:r>
             <a:r>
               <a:rPr dirty="0"/>
-              <a:t> than once, but the </a:t>
+              <a:t>e than once, but the </a:t>
             </a:r>
             <a:r>
               <a:rPr b="1" dirty="0"/>
@@ -8325,7 +8334,7 @@
           </a:ln>
           <a:extLst>
             <a:ext uri="{C572A759-6A51-4108-AA02-DFA0A04FC94B}">
-              <ma14:wrappingTextBoxFlag xmlns:ma14="http://schemas.microsoft.com/office/mac/drawingml/2011/main" xmlns:a14="http://schemas.microsoft.com/office/drawing/2010/main" xmlns:m="http://schemas.openxmlformats.org/officeDocument/2006/math" xmlns="" val="1"/>
+              <ma14:wrappingTextBoxFlag xmlns="" xmlns:m="http://schemas.openxmlformats.org/officeDocument/2006/math" xmlns:a14="http://schemas.microsoft.com/office/drawing/2010/main" xmlns:ma14="http://schemas.microsoft.com/office/mac/drawingml/2011/main" val="1"/>
             </a:ext>
           </a:extLst>
         </p:spPr>
@@ -8392,7 +8401,7 @@
           </a:ln>
           <a:extLst>
             <a:ext uri="{C572A759-6A51-4108-AA02-DFA0A04FC94B}">
-              <ma14:wrappingTextBoxFlag xmlns:ma14="http://schemas.microsoft.com/office/mac/drawingml/2011/main" xmlns:a14="http://schemas.microsoft.com/office/drawing/2010/main" xmlns:m="http://schemas.openxmlformats.org/officeDocument/2006/math" xmlns="" val="1"/>
+              <ma14:wrappingTextBoxFlag xmlns="" xmlns:m="http://schemas.openxmlformats.org/officeDocument/2006/math" xmlns:a14="http://schemas.microsoft.com/office/drawing/2010/main" xmlns:ma14="http://schemas.microsoft.com/office/mac/drawingml/2011/main" val="1"/>
             </a:ext>
           </a:extLst>
         </p:spPr>
@@ -8787,7 +8796,7 @@
           </a:ln>
           <a:extLst>
             <a:ext uri="{C572A759-6A51-4108-AA02-DFA0A04FC94B}">
-              <ma14:wrappingTextBoxFlag xmlns:ma14="http://schemas.microsoft.com/office/mac/drawingml/2011/main" xmlns:a14="http://schemas.microsoft.com/office/drawing/2010/main" xmlns:m="http://schemas.openxmlformats.org/officeDocument/2006/math" xmlns="" val="1"/>
+              <ma14:wrappingTextBoxFlag xmlns="" xmlns:m="http://schemas.openxmlformats.org/officeDocument/2006/math" xmlns:a14="http://schemas.microsoft.com/office/drawing/2010/main" xmlns:ma14="http://schemas.microsoft.com/office/mac/drawingml/2011/main" val="1"/>
             </a:ext>
           </a:extLst>
         </p:spPr>
@@ -8854,7 +8863,7 @@
           </a:ln>
           <a:extLst>
             <a:ext uri="{C572A759-6A51-4108-AA02-DFA0A04FC94B}">
-              <ma14:wrappingTextBoxFlag xmlns:ma14="http://schemas.microsoft.com/office/mac/drawingml/2011/main" xmlns:a14="http://schemas.microsoft.com/office/drawing/2010/main" xmlns:m="http://schemas.openxmlformats.org/officeDocument/2006/math" xmlns="" val="1"/>
+              <ma14:wrappingTextBoxFlag xmlns="" xmlns:m="http://schemas.openxmlformats.org/officeDocument/2006/math" xmlns:a14="http://schemas.microsoft.com/office/drawing/2010/main" xmlns:ma14="http://schemas.microsoft.com/office/mac/drawingml/2011/main" val="1"/>
             </a:ext>
           </a:extLst>
         </p:spPr>

</xml_diff>